<commit_message>
update cloudstack lecture and add cloudstack assignment
</commit_message>
<xml_diff>
--- a/infrastructure-week-5.pptx
+++ b/infrastructure-week-5.pptx
@@ -42,7 +42,8 @@
     <p:sldId id="288" r:id="rId36"/>
     <p:sldId id="289" r:id="rId37"/>
     <p:sldId id="290" r:id="rId38"/>
-    <p:sldId id="259" r:id="rId39"/>
+    <p:sldId id="295" r:id="rId39"/>
+    <p:sldId id="259" r:id="rId40"/>
   </p:sldIdLst>
   <p:sldSz cx="9144000" cy="6858000" type="screen4x3"/>
   <p:notesSz cx="6858000" cy="9144000"/>
@@ -325,7 +326,7 @@
           <a:p>
             <a:fld id="{5C992B2E-871F-DF41-938B-F17F540EA4B5}" type="datetimeFigureOut">
               <a:rPr lang="en-US" smtClean="0"/>
-              <a:t>8/13/16</a:t>
+              <a:t>8/14/16</a:t>
             </a:fld>
             <a:endParaRPr lang="en-US"/>
           </a:p>
@@ -495,7 +496,7 @@
           <a:p>
             <a:fld id="{5C992B2E-871F-DF41-938B-F17F540EA4B5}" type="datetimeFigureOut">
               <a:rPr lang="en-US" smtClean="0"/>
-              <a:t>8/13/16</a:t>
+              <a:t>8/14/16</a:t>
             </a:fld>
             <a:endParaRPr lang="en-US"/>
           </a:p>
@@ -675,7 +676,7 @@
           <a:p>
             <a:fld id="{5C992B2E-871F-DF41-938B-F17F540EA4B5}" type="datetimeFigureOut">
               <a:rPr lang="en-US" smtClean="0"/>
-              <a:t>8/13/16</a:t>
+              <a:t>8/14/16</a:t>
             </a:fld>
             <a:endParaRPr lang="en-US"/>
           </a:p>
@@ -845,7 +846,7 @@
           <a:p>
             <a:fld id="{5C992B2E-871F-DF41-938B-F17F540EA4B5}" type="datetimeFigureOut">
               <a:rPr lang="en-US" smtClean="0"/>
-              <a:t>8/13/16</a:t>
+              <a:t>8/14/16</a:t>
             </a:fld>
             <a:endParaRPr lang="en-US"/>
           </a:p>
@@ -1091,7 +1092,7 @@
           <a:p>
             <a:fld id="{5C992B2E-871F-DF41-938B-F17F540EA4B5}" type="datetimeFigureOut">
               <a:rPr lang="en-US" smtClean="0"/>
-              <a:t>8/13/16</a:t>
+              <a:t>8/14/16</a:t>
             </a:fld>
             <a:endParaRPr lang="en-US"/>
           </a:p>
@@ -1379,7 +1380,7 @@
           <a:p>
             <a:fld id="{5C992B2E-871F-DF41-938B-F17F540EA4B5}" type="datetimeFigureOut">
               <a:rPr lang="en-US" smtClean="0"/>
-              <a:t>8/13/16</a:t>
+              <a:t>8/14/16</a:t>
             </a:fld>
             <a:endParaRPr lang="en-US"/>
           </a:p>
@@ -1801,7 +1802,7 @@
           <a:p>
             <a:fld id="{5C992B2E-871F-DF41-938B-F17F540EA4B5}" type="datetimeFigureOut">
               <a:rPr lang="en-US" smtClean="0"/>
-              <a:t>8/13/16</a:t>
+              <a:t>8/14/16</a:t>
             </a:fld>
             <a:endParaRPr lang="en-US"/>
           </a:p>
@@ -1919,7 +1920,7 @@
           <a:p>
             <a:fld id="{5C992B2E-871F-DF41-938B-F17F540EA4B5}" type="datetimeFigureOut">
               <a:rPr lang="en-US" smtClean="0"/>
-              <a:t>8/13/16</a:t>
+              <a:t>8/14/16</a:t>
             </a:fld>
             <a:endParaRPr lang="en-US"/>
           </a:p>
@@ -2014,7 +2015,7 @@
           <a:p>
             <a:fld id="{5C992B2E-871F-DF41-938B-F17F540EA4B5}" type="datetimeFigureOut">
               <a:rPr lang="en-US" smtClean="0"/>
-              <a:t>8/13/16</a:t>
+              <a:t>8/14/16</a:t>
             </a:fld>
             <a:endParaRPr lang="en-US"/>
           </a:p>
@@ -2291,7 +2292,7 @@
           <a:p>
             <a:fld id="{5C992B2E-871F-DF41-938B-F17F540EA4B5}" type="datetimeFigureOut">
               <a:rPr lang="en-US" smtClean="0"/>
-              <a:t>8/13/16</a:t>
+              <a:t>8/14/16</a:t>
             </a:fld>
             <a:endParaRPr lang="en-US"/>
           </a:p>
@@ -2544,7 +2545,7 @@
           <a:p>
             <a:fld id="{5C992B2E-871F-DF41-938B-F17F540EA4B5}" type="datetimeFigureOut">
               <a:rPr lang="en-US" smtClean="0"/>
-              <a:t>8/13/16</a:t>
+              <a:t>8/14/16</a:t>
             </a:fld>
             <a:endParaRPr lang="en-US"/>
           </a:p>
@@ -2757,7 +2758,7 @@
           <a:p>
             <a:fld id="{5C992B2E-871F-DF41-938B-F17F540EA4B5}" type="datetimeFigureOut">
               <a:rPr lang="en-US" smtClean="0"/>
-              <a:t>8/13/16</a:t>
+              <a:t>8/14/16</a:t>
             </a:fld>
             <a:endParaRPr lang="en-US"/>
           </a:p>
@@ -5385,8 +5386,13 @@
           <a:p>
             <a:r>
               <a:rPr lang="en-US" dirty="0" smtClean="0"/>
-              <a:t>Your account has a default VPC setup in each AWS region</a:t>
-            </a:r>
+              <a:t>Your account has a default VPC setup in each AWS </a:t>
+            </a:r>
+            <a:r>
+              <a:rPr lang="en-US" dirty="0" smtClean="0"/>
+              <a:t>region.</a:t>
+            </a:r>
+            <a:endParaRPr lang="en-US" dirty="0" smtClean="0"/>
           </a:p>
           <a:p>
             <a:endParaRPr lang="en-US" dirty="0" smtClean="0"/>
@@ -6191,7 +6197,11 @@
           <a:p>
             <a:r>
               <a:rPr lang="en-US" dirty="0" smtClean="0"/>
-              <a:t>RDS provides an endpoint for each database which is used by an application for communication</a:t>
+              <a:t>RDS provides an endpoint for each database which is used by an application for </a:t>
+            </a:r>
+            <a:r>
+              <a:rPr lang="en-US" dirty="0" smtClean="0"/>
+              <a:t>communication.</a:t>
             </a:r>
             <a:endParaRPr lang="en-US" dirty="0"/>
           </a:p>
@@ -6283,48 +6293,81 @@
           <a:p>
             <a:r>
               <a:rPr lang="en-US" dirty="0" smtClean="0"/>
-              <a:t>Automated backups: RDS performs a full daily backup of the database and stores transaction logs since the backup job</a:t>
-            </a:r>
-          </a:p>
-          <a:p>
-            <a:pPr lvl="1"/>
-            <a:r>
-              <a:rPr lang="en-US" dirty="0" smtClean="0"/>
-              <a:t>Retains backup data for 1 to 35 days</a:t>
-            </a:r>
-          </a:p>
-          <a:p>
-            <a:pPr lvl="1"/>
-            <a:endParaRPr lang="en-US" dirty="0" smtClean="0"/>
-          </a:p>
-          <a:p>
-            <a:pPr lvl="1"/>
-            <a:r>
-              <a:rPr lang="en-US" dirty="0" smtClean="0"/>
-              <a:t>During recovery full backup is restored and then transaction logs are replayed</a:t>
-            </a:r>
-          </a:p>
-          <a:p>
-            <a:pPr lvl="1"/>
-            <a:endParaRPr lang="en-US" dirty="0" smtClean="0"/>
-          </a:p>
-          <a:p>
-            <a:pPr lvl="1"/>
-            <a:r>
-              <a:rPr lang="en-US" dirty="0" smtClean="0"/>
-              <a:t>Backup data stored on S3</a:t>
-            </a:r>
-          </a:p>
-          <a:p>
-            <a:pPr lvl="1"/>
-            <a:endParaRPr lang="en-US" dirty="0" smtClean="0"/>
-          </a:p>
-          <a:p>
-            <a:pPr lvl="1"/>
-            <a:r>
-              <a:rPr lang="en-US" dirty="0" smtClean="0"/>
-              <a:t>Backups occur during a specified window and the database storage I/O may be significantly reduced</a:t>
-            </a:r>
+              <a:t>Automated backups: RDS performs a full daily backup of the database and stores transaction logs since the backup </a:t>
+            </a:r>
+            <a:r>
+              <a:rPr lang="en-US" dirty="0" smtClean="0"/>
+              <a:t>job.</a:t>
+            </a:r>
+            <a:endParaRPr lang="en-US" dirty="0" smtClean="0"/>
+          </a:p>
+          <a:p>
+            <a:pPr lvl="1"/>
+            <a:r>
+              <a:rPr lang="en-US" dirty="0" smtClean="0"/>
+              <a:t>Retains backup data for 1 to 35 </a:t>
+            </a:r>
+            <a:r>
+              <a:rPr lang="en-US" dirty="0" smtClean="0"/>
+              <a:t>days.</a:t>
+            </a:r>
+            <a:endParaRPr lang="en-US" dirty="0" smtClean="0"/>
+          </a:p>
+          <a:p>
+            <a:pPr lvl="1"/>
+            <a:endParaRPr lang="en-US" dirty="0" smtClean="0"/>
+          </a:p>
+          <a:p>
+            <a:pPr lvl="1"/>
+            <a:r>
+              <a:rPr lang="en-US" dirty="0" smtClean="0"/>
+              <a:t>During recovery full backup is restored and then transaction logs are </a:t>
+            </a:r>
+            <a:r>
+              <a:rPr lang="en-US" dirty="0" smtClean="0"/>
+              <a:t>replayed.</a:t>
+            </a:r>
+            <a:endParaRPr lang="en-US" dirty="0" smtClean="0"/>
+          </a:p>
+          <a:p>
+            <a:pPr lvl="1"/>
+            <a:endParaRPr lang="en-US" dirty="0" smtClean="0"/>
+          </a:p>
+          <a:p>
+            <a:pPr lvl="1"/>
+            <a:r>
+              <a:rPr lang="en-US" dirty="0" smtClean="0"/>
+              <a:t>Backup data </a:t>
+            </a:r>
+            <a:r>
+              <a:rPr lang="en-US" dirty="0" smtClean="0"/>
+              <a:t>is stored </a:t>
+            </a:r>
+            <a:r>
+              <a:rPr lang="en-US" dirty="0" smtClean="0"/>
+              <a:t>on </a:t>
+            </a:r>
+            <a:r>
+              <a:rPr lang="en-US" dirty="0" smtClean="0"/>
+              <a:t>S3.</a:t>
+            </a:r>
+            <a:endParaRPr lang="en-US" dirty="0" smtClean="0"/>
+          </a:p>
+          <a:p>
+            <a:pPr lvl="1"/>
+            <a:endParaRPr lang="en-US" dirty="0" smtClean="0"/>
+          </a:p>
+          <a:p>
+            <a:pPr lvl="1"/>
+            <a:r>
+              <a:rPr lang="en-US" dirty="0" smtClean="0"/>
+              <a:t>Backups occur during a specified window and the database storage I/O may be significantly </a:t>
+            </a:r>
+            <a:r>
+              <a:rPr lang="en-US" dirty="0" smtClean="0"/>
+              <a:t>reduced.</a:t>
+            </a:r>
+            <a:endParaRPr lang="en-US" dirty="0" smtClean="0"/>
           </a:p>
         </p:txBody>
       </p:sp>
@@ -6405,49 +6448,78 @@
           <a:p>
             <a:r>
               <a:rPr lang="en-US" dirty="0" smtClean="0"/>
-              <a:t>RDS snapshots are initiated manually by the user and exist indefinitely – even after database is removed</a:t>
-            </a:r>
-          </a:p>
-          <a:p>
-            <a:pPr lvl="1"/>
-            <a:r>
-              <a:rPr lang="en-US" dirty="0" smtClean="0"/>
-              <a:t>It’s possible to use RDS data backups to copy databases (for testing or to move)</a:t>
-            </a:r>
-          </a:p>
-          <a:p>
-            <a:pPr lvl="1"/>
-            <a:endParaRPr lang="en-US" dirty="0" smtClean="0"/>
-          </a:p>
-          <a:p>
-            <a:r>
-              <a:rPr lang="en-US" dirty="0" smtClean="0"/>
-              <a:t>Multi-AZ capability provides standby database instance in a separate AZ for fail-over purposes</a:t>
-            </a:r>
-          </a:p>
-          <a:p>
-            <a:pPr lvl="1"/>
-            <a:r>
-              <a:rPr lang="en-US" dirty="0" smtClean="0"/>
-              <a:t>Writes to main database server are synchronized to the standby database</a:t>
-            </a:r>
-          </a:p>
-          <a:p>
-            <a:pPr lvl="1"/>
-            <a:endParaRPr lang="en-US" dirty="0" smtClean="0"/>
-          </a:p>
-          <a:p>
-            <a:pPr lvl="1"/>
-            <a:r>
-              <a:rPr lang="en-US" dirty="0" smtClean="0"/>
-              <a:t>Main purpose is for greater service resiliency, it does not improve performance</a:t>
-            </a:r>
+              <a:t>RDS snapshots are initiated manually by the user and exist indefinitely – even after database is </a:t>
+            </a:r>
+            <a:r>
+              <a:rPr lang="en-US" dirty="0" smtClean="0"/>
+              <a:t>removed.</a:t>
+            </a:r>
+            <a:endParaRPr lang="en-US" dirty="0" smtClean="0"/>
+          </a:p>
+          <a:p>
+            <a:pPr lvl="1"/>
+            <a:r>
+              <a:rPr lang="en-US" dirty="0" smtClean="0"/>
+              <a:t>It’s possible to use RDS data backups to copy databases (for testing or to move</a:t>
+            </a:r>
+            <a:r>
+              <a:rPr lang="en-US" dirty="0" smtClean="0"/>
+              <a:t>).</a:t>
+            </a:r>
+            <a:endParaRPr lang="en-US" dirty="0" smtClean="0"/>
+          </a:p>
+          <a:p>
+            <a:pPr lvl="1"/>
+            <a:endParaRPr lang="en-US" dirty="0" smtClean="0"/>
+          </a:p>
+          <a:p>
+            <a:r>
+              <a:rPr lang="en-US" dirty="0" smtClean="0"/>
+              <a:t>Multi-AZ capability provides standby database instance in a separate AZ for fail-over </a:t>
+            </a:r>
+            <a:r>
+              <a:rPr lang="en-US" dirty="0" smtClean="0"/>
+              <a:t>purposes.</a:t>
+            </a:r>
+            <a:endParaRPr lang="en-US" dirty="0" smtClean="0"/>
+          </a:p>
+          <a:p>
+            <a:pPr lvl="1"/>
+            <a:r>
+              <a:rPr lang="en-US" dirty="0" smtClean="0"/>
+              <a:t>Writes to main database server are synchronized to the standby </a:t>
+            </a:r>
+            <a:r>
+              <a:rPr lang="en-US" dirty="0" smtClean="0"/>
+              <a:t>database.</a:t>
+            </a:r>
+            <a:endParaRPr lang="en-US" dirty="0" smtClean="0"/>
+          </a:p>
+          <a:p>
+            <a:pPr lvl="1"/>
+            <a:endParaRPr lang="en-US" dirty="0" smtClean="0"/>
+          </a:p>
+          <a:p>
+            <a:pPr lvl="1"/>
+            <a:r>
+              <a:rPr lang="en-US" dirty="0" smtClean="0"/>
+              <a:t>Main purpose is for greater service resiliency, it does not improve </a:t>
+            </a:r>
+            <a:r>
+              <a:rPr lang="en-US" dirty="0" smtClean="0"/>
+              <a:t>performance.</a:t>
+            </a:r>
+            <a:endParaRPr lang="en-US" dirty="0" smtClean="0"/>
           </a:p>
           <a:p>
             <a:pPr lvl="2"/>
             <a:r>
               <a:rPr lang="en-US" dirty="0" smtClean="0"/>
-              <a:t>Although, it allows RDS to update or backup a server without degrading I/O</a:t>
+              <a:t>Although, it allows RDS to update or backup a server without degrading I/</a:t>
+            </a:r>
+            <a:r>
+              <a:rPr lang="en-US" dirty="0" smtClean="0"/>
+              <a:t>O.</a:t>
             </a:r>
             <a:endParaRPr lang="en-US" dirty="0"/>
           </a:p>
@@ -6545,18 +6617,28 @@
             </a:r>
             <a:r>
               <a:rPr lang="en-US" dirty="0" smtClean="0"/>
-              <a:t> offered in a multi-AZ architecture (2 DBs in 3 AZs = 6 total!)</a:t>
-            </a:r>
-          </a:p>
-          <a:p>
-            <a:pPr lvl="1"/>
-            <a:endParaRPr lang="en-US" dirty="0" smtClean="0"/>
-          </a:p>
-          <a:p>
-            <a:r>
-              <a:rPr lang="en-US" dirty="0" smtClean="0"/>
-              <a:t>Read Replica: a database instance in a separate AZ which asynchronously copies data from the main database</a:t>
-            </a:r>
+              <a:t> offered in a multi-AZ architecture (2 DBs in 3 AZs = 6 total!</a:t>
+            </a:r>
+            <a:r>
+              <a:rPr lang="en-US" dirty="0" smtClean="0"/>
+              <a:t>).</a:t>
+            </a:r>
+            <a:endParaRPr lang="en-US" dirty="0" smtClean="0"/>
+          </a:p>
+          <a:p>
+            <a:pPr lvl="1"/>
+            <a:endParaRPr lang="en-US" dirty="0" smtClean="0"/>
+          </a:p>
+          <a:p>
+            <a:r>
+              <a:rPr lang="en-US" dirty="0" smtClean="0"/>
+              <a:t>Read Replica: a database instance in a separate AZ which asynchronously copies data from the main </a:t>
+            </a:r>
+            <a:r>
+              <a:rPr lang="en-US" dirty="0" smtClean="0"/>
+              <a:t>database.</a:t>
+            </a:r>
+            <a:endParaRPr lang="en-US" dirty="0" smtClean="0"/>
           </a:p>
           <a:p>
             <a:pPr lvl="1"/>
@@ -6573,30 +6655,45 @@
             <a:pPr lvl="1"/>
             <a:r>
               <a:rPr lang="en-US" dirty="0" smtClean="0"/>
-              <a:t>Scales database performance by allowing database clients to read data from multiple instances</a:t>
-            </a:r>
-          </a:p>
-          <a:p>
-            <a:pPr lvl="1"/>
-            <a:endParaRPr lang="en-US" dirty="0" smtClean="0"/>
-          </a:p>
-          <a:p>
-            <a:pPr lvl="1"/>
-            <a:r>
-              <a:rPr lang="en-US" dirty="0" smtClean="0"/>
-              <a:t>Up to 5 read replicas supported </a:t>
-            </a:r>
-          </a:p>
-          <a:p>
-            <a:pPr lvl="1"/>
-            <a:endParaRPr lang="en-US" dirty="0" smtClean="0"/>
-          </a:p>
-          <a:p>
-            <a:pPr lvl="1"/>
-            <a:r>
-              <a:rPr lang="en-US" dirty="0" smtClean="0"/>
-              <a:t>Owner can promote a read replica into a separate database, splitting relationship with parent</a:t>
-            </a:r>
+              <a:t>Scales database performance by allowing database clients to read data from multiple </a:t>
+            </a:r>
+            <a:r>
+              <a:rPr lang="en-US" dirty="0" smtClean="0"/>
+              <a:t>instances.</a:t>
+            </a:r>
+            <a:endParaRPr lang="en-US" dirty="0" smtClean="0"/>
+          </a:p>
+          <a:p>
+            <a:pPr lvl="1"/>
+            <a:endParaRPr lang="en-US" dirty="0" smtClean="0"/>
+          </a:p>
+          <a:p>
+            <a:pPr lvl="1"/>
+            <a:r>
+              <a:rPr lang="en-US" dirty="0" smtClean="0"/>
+              <a:t>Up to 5 read replicas </a:t>
+            </a:r>
+            <a:r>
+              <a:rPr lang="en-US" dirty="0" smtClean="0"/>
+              <a:t>supported. </a:t>
+            </a:r>
+            <a:endParaRPr lang="en-US" dirty="0" smtClean="0"/>
+          </a:p>
+          <a:p>
+            <a:pPr lvl="1"/>
+            <a:endParaRPr lang="en-US" dirty="0" smtClean="0"/>
+          </a:p>
+          <a:p>
+            <a:pPr lvl="1"/>
+            <a:r>
+              <a:rPr lang="en-US" dirty="0" smtClean="0"/>
+              <a:t>Owner can promote a read replica into a separate database, splitting relationship with </a:t>
+            </a:r>
+            <a:r>
+              <a:rPr lang="en-US" dirty="0" smtClean="0"/>
+              <a:t>parent.</a:t>
+            </a:r>
+            <a:endParaRPr lang="en-US" dirty="0" smtClean="0"/>
           </a:p>
         </p:txBody>
       </p:sp>
@@ -6672,42 +6769,66 @@
           <a:p>
             <a:r>
               <a:rPr lang="en-US" dirty="0" smtClean="0"/>
-              <a:t>Create an RDS database</a:t>
-            </a:r>
-          </a:p>
-          <a:p>
-            <a:pPr lvl="1"/>
-            <a:r>
-              <a:rPr lang="en-US" dirty="0" smtClean="0"/>
-              <a:t>Create database security group</a:t>
-            </a:r>
-          </a:p>
-          <a:p>
-            <a:pPr lvl="1"/>
-            <a:endParaRPr lang="en-US" dirty="0" smtClean="0"/>
-          </a:p>
-          <a:p>
-            <a:r>
-              <a:rPr lang="en-US" dirty="0" smtClean="0"/>
-              <a:t>Locate database endpoint</a:t>
-            </a:r>
-          </a:p>
-          <a:p>
-            <a:endParaRPr lang="en-US" dirty="0" smtClean="0"/>
-          </a:p>
-          <a:p>
-            <a:r>
-              <a:rPr lang="en-US" dirty="0" smtClean="0"/>
-              <a:t>Review automatic backup schedule</a:t>
-            </a:r>
-          </a:p>
-          <a:p>
-            <a:endParaRPr lang="en-US" dirty="0" smtClean="0"/>
-          </a:p>
-          <a:p>
-            <a:r>
-              <a:rPr lang="en-US" dirty="0" smtClean="0"/>
-              <a:t>Perform a snapshot</a:t>
+              <a:t>Create an RDS </a:t>
+            </a:r>
+            <a:r>
+              <a:rPr lang="en-US" dirty="0" smtClean="0"/>
+              <a:t>database.</a:t>
+            </a:r>
+            <a:endParaRPr lang="en-US" dirty="0" smtClean="0"/>
+          </a:p>
+          <a:p>
+            <a:pPr lvl="1"/>
+            <a:r>
+              <a:rPr lang="en-US" dirty="0" smtClean="0"/>
+              <a:t>Create database security </a:t>
+            </a:r>
+            <a:r>
+              <a:rPr lang="en-US" dirty="0" smtClean="0"/>
+              <a:t>group.</a:t>
+            </a:r>
+            <a:endParaRPr lang="en-US" dirty="0" smtClean="0"/>
+          </a:p>
+          <a:p>
+            <a:pPr lvl="1"/>
+            <a:endParaRPr lang="en-US" dirty="0" smtClean="0"/>
+          </a:p>
+          <a:p>
+            <a:r>
+              <a:rPr lang="en-US" dirty="0" smtClean="0"/>
+              <a:t>Locate database </a:t>
+            </a:r>
+            <a:r>
+              <a:rPr lang="en-US" dirty="0" smtClean="0"/>
+              <a:t>endpoint.</a:t>
+            </a:r>
+            <a:endParaRPr lang="en-US" dirty="0" smtClean="0"/>
+          </a:p>
+          <a:p>
+            <a:endParaRPr lang="en-US" dirty="0" smtClean="0"/>
+          </a:p>
+          <a:p>
+            <a:r>
+              <a:rPr lang="en-US" dirty="0" smtClean="0"/>
+              <a:t>Review automatic backup </a:t>
+            </a:r>
+            <a:r>
+              <a:rPr lang="en-US" dirty="0" smtClean="0"/>
+              <a:t>schedule.</a:t>
+            </a:r>
+            <a:endParaRPr lang="en-US" dirty="0" smtClean="0"/>
+          </a:p>
+          <a:p>
+            <a:endParaRPr lang="en-US" dirty="0" smtClean="0"/>
+          </a:p>
+          <a:p>
+            <a:r>
+              <a:rPr lang="en-US" dirty="0" smtClean="0"/>
+              <a:t>Perform a </a:t>
+            </a:r>
+            <a:r>
+              <a:rPr lang="en-US" dirty="0" smtClean="0"/>
+              <a:t>snapshot.</a:t>
             </a:r>
             <a:endParaRPr lang="en-US" dirty="0"/>
           </a:p>
@@ -6822,54 +6943,74 @@
             </a:r>
             <a:r>
               <a:rPr lang="en-US" dirty="0" smtClean="0"/>
-              <a:t> database based on document storage</a:t>
-            </a:r>
-          </a:p>
-          <a:p>
-            <a:pPr lvl="1"/>
-            <a:r>
-              <a:rPr lang="en-US" dirty="0" smtClean="0"/>
-              <a:t>Each document is comprised of key/value pairs stored in JavaScript Object Notation (JSON)</a:t>
-            </a:r>
-          </a:p>
-          <a:p>
-            <a:pPr lvl="1"/>
-            <a:r>
-              <a:rPr lang="en-US" dirty="0" smtClean="0"/>
-              <a:t>Similar to </a:t>
-            </a:r>
-            <a:r>
-              <a:rPr lang="en-US" dirty="0" err="1" smtClean="0"/>
-              <a:t>MongoDB</a:t>
-            </a:r>
-            <a:endParaRPr lang="en-US" dirty="0" smtClean="0"/>
-          </a:p>
-          <a:p>
-            <a:pPr lvl="1"/>
-            <a:endParaRPr lang="en-US" dirty="0" smtClean="0"/>
-          </a:p>
-          <a:p>
-            <a:r>
-              <a:rPr lang="en-US" dirty="0" smtClean="0"/>
-              <a:t>Supports highly scalable number of reads and writes with unlimited data storage</a:t>
-            </a:r>
-          </a:p>
-          <a:p>
-            <a:pPr lvl="1"/>
-            <a:r>
-              <a:rPr lang="en-US" dirty="0" smtClean="0"/>
-              <a:t>Automatically scales data storage, no need to reconfigure database like RDS (relational)</a:t>
-            </a:r>
-          </a:p>
-          <a:p>
-            <a:pPr lvl="1"/>
-            <a:endParaRPr lang="en-US" dirty="0" smtClean="0"/>
-          </a:p>
-          <a:p>
-            <a:r>
-              <a:rPr lang="en-US" dirty="0" smtClean="0"/>
-              <a:t>Data replicated between 3 separate datacenters (not necessarily in separate AZs)</a:t>
-            </a:r>
+              <a:t> </a:t>
+            </a:r>
+            <a:r>
+              <a:rPr lang="en-US" dirty="0" smtClean="0"/>
+              <a:t>database utilizing a document processing architecture.</a:t>
+            </a:r>
+          </a:p>
+          <a:p>
+            <a:pPr lvl="1"/>
+            <a:r>
+              <a:rPr lang="en-US" dirty="0" smtClean="0"/>
+              <a:t>Based on Google Big Table design.</a:t>
+            </a:r>
+            <a:endParaRPr lang="en-US" dirty="0" smtClean="0"/>
+          </a:p>
+          <a:p>
+            <a:pPr lvl="1"/>
+            <a:r>
+              <a:rPr lang="en-US" dirty="0" smtClean="0"/>
+              <a:t>Each document is comprised of key/value pairs stored in JavaScript Object Notation (JSON</a:t>
+            </a:r>
+            <a:r>
+              <a:rPr lang="en-US" dirty="0" smtClean="0"/>
+              <a:t>).</a:t>
+            </a:r>
+            <a:endParaRPr lang="en-US" dirty="0" smtClean="0"/>
+          </a:p>
+          <a:p>
+            <a:pPr lvl="1"/>
+            <a:endParaRPr lang="en-US" dirty="0" smtClean="0"/>
+          </a:p>
+          <a:p>
+            <a:r>
+              <a:rPr lang="en-US" dirty="0" smtClean="0"/>
+              <a:t>Supports highly scalable number of reads and writes with unlimited data </a:t>
+            </a:r>
+            <a:r>
+              <a:rPr lang="en-US" dirty="0" smtClean="0"/>
+              <a:t>storage.</a:t>
+            </a:r>
+            <a:endParaRPr lang="en-US" dirty="0" smtClean="0"/>
+          </a:p>
+          <a:p>
+            <a:pPr lvl="1"/>
+            <a:r>
+              <a:rPr lang="en-US" dirty="0" smtClean="0"/>
+              <a:t>Automatically scales data storage, no need to reconfigure database like RDS (relational</a:t>
+            </a:r>
+            <a:r>
+              <a:rPr lang="en-US" dirty="0" smtClean="0"/>
+              <a:t>).</a:t>
+            </a:r>
+            <a:endParaRPr lang="en-US" dirty="0" smtClean="0"/>
+          </a:p>
+          <a:p>
+            <a:pPr lvl="1"/>
+            <a:endParaRPr lang="en-US" dirty="0" smtClean="0"/>
+          </a:p>
+          <a:p>
+            <a:r>
+              <a:rPr lang="en-US" dirty="0" smtClean="0"/>
+              <a:t>Data replicated between 3 separate datacenters (not necessarily in separate AZs</a:t>
+            </a:r>
+            <a:r>
+              <a:rPr lang="en-US" dirty="0" smtClean="0"/>
+              <a:t>).</a:t>
+            </a:r>
+            <a:endParaRPr lang="en-US" dirty="0" smtClean="0"/>
           </a:p>
           <a:p>
             <a:pPr lvl="1"/>
@@ -7062,8 +7203,13 @@
             <a:pPr lvl="1"/>
             <a:r>
               <a:rPr lang="en-US" dirty="0" smtClean="0"/>
-              <a:t>Online Transaction Processing (OLTP) focuses on querying and maintaining individual transactions</a:t>
-            </a:r>
+              <a:t>Online Transaction Processing (OLTP) focuses on querying and maintaining individual </a:t>
+            </a:r>
+            <a:r>
+              <a:rPr lang="en-US" dirty="0" smtClean="0"/>
+              <a:t>transactions.</a:t>
+            </a:r>
+            <a:endParaRPr lang="en-US" dirty="0" smtClean="0"/>
           </a:p>
           <a:p>
             <a:pPr lvl="2"/>
@@ -7080,8 +7226,13 @@
             <a:pPr lvl="1"/>
             <a:r>
               <a:rPr lang="en-US" dirty="0" smtClean="0"/>
-              <a:t>Online Analytical Processing (OLAP) focuses on the analysis of aggregate sets of data</a:t>
-            </a:r>
+              <a:t>Online Analytical Processing (OLAP) focuses on the analysis of aggregate sets of </a:t>
+            </a:r>
+            <a:r>
+              <a:rPr lang="en-US" dirty="0" smtClean="0"/>
+              <a:t>data.</a:t>
+            </a:r>
+            <a:endParaRPr lang="en-US" dirty="0" smtClean="0"/>
           </a:p>
           <a:p>
             <a:pPr lvl="2"/>
@@ -7097,15 +7248,25 @@
           <a:p>
             <a:r>
               <a:rPr lang="en-US" dirty="0" smtClean="0"/>
-              <a:t>Uses columnar storage to improve performance</a:t>
-            </a:r>
-          </a:p>
-          <a:p>
-            <a:pPr lvl="1"/>
-            <a:r>
-              <a:rPr lang="en-US" dirty="0" smtClean="0"/>
-              <a:t>Generally computation is performed on values within a column, so store them in the same page to improve query performance (reduce I/O)</a:t>
-            </a:r>
+              <a:t>Uses columnar storage to improve </a:t>
+            </a:r>
+            <a:r>
+              <a:rPr lang="en-US" dirty="0" smtClean="0"/>
+              <a:t>performance.</a:t>
+            </a:r>
+            <a:endParaRPr lang="en-US" dirty="0" smtClean="0"/>
+          </a:p>
+          <a:p>
+            <a:pPr lvl="1"/>
+            <a:r>
+              <a:rPr lang="en-US" dirty="0" smtClean="0"/>
+              <a:t>Generally computation is performed on values within a column, so store them in the same page to improve query performance (reduce I/O</a:t>
+            </a:r>
+            <a:r>
+              <a:rPr lang="en-US" dirty="0" smtClean="0"/>
+              <a:t>).</a:t>
+            </a:r>
+            <a:endParaRPr lang="en-US" dirty="0" smtClean="0"/>
           </a:p>
         </p:txBody>
       </p:sp>
@@ -7175,6 +7336,198 @@
         </p:nvSpPr>
         <p:spPr/>
         <p:txBody>
+          <a:bodyPr/>
+          <a:lstStyle/>
+          <a:p>
+            <a:r>
+              <a:rPr lang="en-US" dirty="0" smtClean="0"/>
+              <a:t>Directory Service</a:t>
+            </a:r>
+            <a:endParaRPr lang="en-US" dirty="0"/>
+          </a:p>
+        </p:txBody>
+      </p:sp>
+      <p:sp>
+        <p:nvSpPr>
+          <p:cNvPr id="3" name="Content Placeholder 2"/>
+          <p:cNvSpPr>
+            <a:spLocks noGrp="1"/>
+          </p:cNvSpPr>
+          <p:nvPr>
+            <p:ph idx="1"/>
+          </p:nvPr>
+        </p:nvSpPr>
+        <p:spPr>
+          <a:xfrm>
+            <a:off x="457200" y="1600200"/>
+            <a:ext cx="8229600" cy="4962802"/>
+          </a:xfrm>
+        </p:spPr>
+        <p:txBody>
+          <a:bodyPr>
+            <a:normAutofit fontScale="77500" lnSpcReduction="20000"/>
+          </a:bodyPr>
+          <a:lstStyle/>
+          <a:p>
+            <a:r>
+              <a:rPr lang="en-US" dirty="0" smtClean="0"/>
+              <a:t>Provides multiple ways to use Microsoft Active Directory with AWS services.</a:t>
+            </a:r>
+          </a:p>
+          <a:p>
+            <a:endParaRPr lang="en-US" dirty="0" smtClean="0"/>
+          </a:p>
+          <a:p>
+            <a:r>
+              <a:rPr lang="en-US" dirty="0" smtClean="0"/>
+              <a:t>Three options:</a:t>
+            </a:r>
+          </a:p>
+          <a:p>
+            <a:pPr lvl="1"/>
+            <a:r>
+              <a:rPr lang="en-US" dirty="0" smtClean="0"/>
+              <a:t>Simple AD</a:t>
+            </a:r>
+          </a:p>
+          <a:p>
+            <a:pPr lvl="2"/>
+            <a:r>
+              <a:rPr lang="en-US" dirty="0" smtClean="0"/>
+              <a:t>Microsoft AD-compatible service powered by Samba 4.</a:t>
+            </a:r>
+          </a:p>
+          <a:p>
+            <a:pPr lvl="2"/>
+            <a:r>
+              <a:rPr lang="en-US" dirty="0" smtClean="0"/>
+              <a:t>Supports most </a:t>
+            </a:r>
+            <a:r>
+              <a:rPr lang="en-US" smtClean="0"/>
+              <a:t>AD functionality.</a:t>
+            </a:r>
+            <a:endParaRPr lang="en-US" dirty="0" smtClean="0"/>
+          </a:p>
+          <a:p>
+            <a:pPr lvl="2"/>
+            <a:r>
+              <a:rPr lang="en-US" dirty="0" smtClean="0"/>
+              <a:t>Designed for less than 5000 users.</a:t>
+            </a:r>
+          </a:p>
+          <a:p>
+            <a:pPr lvl="2"/>
+            <a:endParaRPr lang="en-US" dirty="0" smtClean="0"/>
+          </a:p>
+          <a:p>
+            <a:pPr lvl="1"/>
+            <a:r>
+              <a:rPr lang="en-US" dirty="0" smtClean="0"/>
+              <a:t>Microsoft AD Enterprise</a:t>
+            </a:r>
+          </a:p>
+          <a:p>
+            <a:pPr lvl="2"/>
+            <a:r>
+              <a:rPr lang="en-US" dirty="0" smtClean="0"/>
+              <a:t>Full Microsoft AD service managed by AWS.</a:t>
+            </a:r>
+          </a:p>
+          <a:p>
+            <a:pPr lvl="2"/>
+            <a:r>
+              <a:rPr lang="en-US" dirty="0" smtClean="0"/>
+              <a:t>Designed for more than 5000 users.</a:t>
+            </a:r>
+          </a:p>
+          <a:p>
+            <a:pPr lvl="2"/>
+            <a:endParaRPr lang="en-US" dirty="0" smtClean="0"/>
+          </a:p>
+          <a:p>
+            <a:pPr lvl="1"/>
+            <a:r>
+              <a:rPr lang="en-US" dirty="0" smtClean="0"/>
+              <a:t>AD Connector</a:t>
+            </a:r>
+          </a:p>
+          <a:p>
+            <a:pPr lvl="2"/>
+            <a:r>
+              <a:rPr lang="en-US" dirty="0" smtClean="0"/>
+              <a:t>Proxy service for connecting on-premise AD servers to AWS resources.</a:t>
+            </a:r>
+            <a:endParaRPr lang="en-US" dirty="0"/>
+          </a:p>
+        </p:txBody>
+      </p:sp>
+      <p:pic>
+        <p:nvPicPr>
+          <p:cNvPr id="4" name="Picture 3"/>
+          <p:cNvPicPr>
+            <a:picLocks noChangeAspect="1"/>
+          </p:cNvPicPr>
+          <p:nvPr/>
+        </p:nvPicPr>
+        <p:blipFill>
+          <a:blip r:embed="rId2"/>
+          <a:stretch>
+            <a:fillRect/>
+          </a:stretch>
+        </p:blipFill>
+        <p:spPr>
+          <a:xfrm>
+            <a:off x="7203938" y="400287"/>
+            <a:ext cx="1596227" cy="1104589"/>
+          </a:xfrm>
+          <a:prstGeom prst="rect">
+            <a:avLst/>
+          </a:prstGeom>
+        </p:spPr>
+      </p:pic>
+    </p:spTree>
+    <p:extLst>
+      <p:ext uri="{BB962C8B-B14F-4D97-AF65-F5344CB8AC3E}">
+        <p14:creationId xmlns:p14="http://schemas.microsoft.com/office/powerpoint/2010/main" val="2256972082"/>
+      </p:ext>
+    </p:extLst>
+  </p:cSld>
+  <p:clrMapOvr>
+    <a:masterClrMapping/>
+  </p:clrMapOvr>
+</p:sld>
+</file>
+
+<file path=ppt/slides/slide39.xml><?xml version="1.0" encoding="utf-8"?>
+<p:sld xmlns:a="http://schemas.openxmlformats.org/drawingml/2006/main" xmlns:r="http://schemas.openxmlformats.org/officeDocument/2006/relationships" xmlns:p="http://schemas.openxmlformats.org/presentationml/2006/main">
+  <p:cSld>
+    <p:spTree>
+      <p:nvGrpSpPr>
+        <p:cNvPr id="1" name=""/>
+        <p:cNvGrpSpPr/>
+        <p:nvPr/>
+      </p:nvGrpSpPr>
+      <p:grpSpPr>
+        <a:xfrm>
+          <a:off x="0" y="0"/>
+          <a:ext cx="0" cy="0"/>
+          <a:chOff x="0" y="0"/>
+          <a:chExt cx="0" cy="0"/>
+        </a:xfrm>
+      </p:grpSpPr>
+      <p:sp>
+        <p:nvSpPr>
+          <p:cNvPr id="2" name="Title 1"/>
+          <p:cNvSpPr>
+            <a:spLocks noGrp="1"/>
+          </p:cNvSpPr>
+          <p:nvPr>
+            <p:ph type="title"/>
+          </p:nvPr>
+        </p:nvSpPr>
+        <p:spPr/>
+        <p:txBody>
           <a:bodyPr>
             <a:normAutofit/>
           </a:bodyPr>
@@ -7212,13 +7565,8 @@
           <a:p>
             <a:r>
               <a:rPr lang="en-US" dirty="0" smtClean="0"/>
-              <a:t>Assignment </a:t>
-            </a:r>
-            <a:r>
-              <a:rPr lang="en-US" dirty="0" smtClean="0"/>
-              <a:t>5</a:t>
-            </a:r>
-            <a:endParaRPr lang="en-US" dirty="0" smtClean="0"/>
+              <a:t>Assignment 5</a:t>
+            </a:r>
           </a:p>
           <a:p>
             <a:r>
@@ -7233,7 +7581,6 @@
               <a:rPr lang="en-US" dirty="0" smtClean="0"/>
               <a:t>Chapters 3 &amp; 4</a:t>
             </a:r>
-            <a:endParaRPr lang="en-US" dirty="0" smtClean="0"/>
           </a:p>
         </p:txBody>
       </p:sp>

</xml_diff>